<commit_message>
Added another example to requirements.pptx
</commit_message>
<xml_diff>
--- a/Documents/Requirements.pptx
+++ b/Documents/Requirements.pptx
@@ -307,7 +307,7 @@
           <a:p>
             <a:fld id="{4AAD347D-5ACD-4C99-B74B-A9C85AD731AF}" type="datetimeFigureOut">
               <a:rPr lang="en-US" dirty="0"/>
-              <a:t>2/17/2018</a:t>
+              <a:t>2/19/2018</a:t>
             </a:fld>
             <a:endParaRPr lang="en-US" dirty="0"/>
           </a:p>
@@ -577,7 +577,7 @@
           <a:p>
             <a:fld id="{4509A250-FF31-4206-8172-F9D3106AACB1}" type="datetimeFigureOut">
               <a:rPr lang="en-US" dirty="0"/>
-              <a:t>2/17/2018</a:t>
+              <a:t>2/19/2018</a:t>
             </a:fld>
             <a:endParaRPr lang="en-US" dirty="0"/>
           </a:p>
@@ -766,7 +766,7 @@
           <a:p>
             <a:fld id="{4509A250-FF31-4206-8172-F9D3106AACB1}" type="datetimeFigureOut">
               <a:rPr lang="en-US" dirty="0"/>
-              <a:t>2/17/2018</a:t>
+              <a:t>2/19/2018</a:t>
             </a:fld>
             <a:endParaRPr lang="en-US" dirty="0"/>
           </a:p>
@@ -1032,7 +1032,7 @@
           <a:p>
             <a:fld id="{4509A250-FF31-4206-8172-F9D3106AACB1}" type="datetimeFigureOut">
               <a:rPr lang="en-US" dirty="0"/>
-              <a:t>2/17/2018</a:t>
+              <a:t>2/19/2018</a:t>
             </a:fld>
             <a:endParaRPr lang="en-US" dirty="0"/>
           </a:p>
@@ -1354,7 +1354,7 @@
           <a:p>
             <a:fld id="{4509A250-FF31-4206-8172-F9D3106AACB1}" type="datetimeFigureOut">
               <a:rPr lang="en-US" dirty="0"/>
-              <a:t>2/17/2018</a:t>
+              <a:t>2/19/2018</a:t>
             </a:fld>
             <a:endParaRPr lang="en-US" dirty="0"/>
           </a:p>
@@ -1968,7 +1968,7 @@
           <a:p>
             <a:fld id="{4509A250-FF31-4206-8172-F9D3106AACB1}" type="datetimeFigureOut">
               <a:rPr lang="en-US" dirty="0"/>
-              <a:t>2/17/2018</a:t>
+              <a:t>2/19/2018</a:t>
             </a:fld>
             <a:endParaRPr lang="en-US" dirty="0"/>
           </a:p>
@@ -2810,7 +2810,7 @@
           <a:p>
             <a:fld id="{4509A250-FF31-4206-8172-F9D3106AACB1}" type="datetimeFigureOut">
               <a:rPr lang="en-US" dirty="0"/>
-              <a:t>2/17/2018</a:t>
+              <a:t>2/19/2018</a:t>
             </a:fld>
             <a:endParaRPr lang="en-US" dirty="0"/>
           </a:p>
@@ -2975,7 +2975,7 @@
           <a:p>
             <a:fld id="{4509A250-FF31-4206-8172-F9D3106AACB1}" type="datetimeFigureOut">
               <a:rPr lang="en-US" dirty="0"/>
-              <a:t>2/17/2018</a:t>
+              <a:t>2/19/2018</a:t>
             </a:fld>
             <a:endParaRPr lang="en-US" dirty="0"/>
           </a:p>
@@ -3150,7 +3150,7 @@
           <a:p>
             <a:fld id="{4509A250-FF31-4206-8172-F9D3106AACB1}" type="datetimeFigureOut">
               <a:rPr lang="en-US" dirty="0"/>
-              <a:t>2/17/2018</a:t>
+              <a:t>2/19/2018</a:t>
             </a:fld>
             <a:endParaRPr lang="en-US" dirty="0"/>
           </a:p>
@@ -3315,7 +3315,7 @@
           <a:p>
             <a:fld id="{9796027F-7875-4030-9381-8BD8C4F21935}" type="datetimeFigureOut">
               <a:rPr lang="en-US" dirty="0"/>
-              <a:t>2/17/2018</a:t>
+              <a:t>2/19/2018</a:t>
             </a:fld>
             <a:endParaRPr lang="en-US" dirty="0"/>
           </a:p>
@@ -3557,7 +3557,7 @@
           <a:p>
             <a:fld id="{9796027F-7875-4030-9381-8BD8C4F21935}" type="datetimeFigureOut">
               <a:rPr lang="en-US" dirty="0"/>
-              <a:t>2/17/2018</a:t>
+              <a:t>2/19/2018</a:t>
             </a:fld>
             <a:endParaRPr lang="en-US" dirty="0"/>
           </a:p>
@@ -3844,7 +3844,7 @@
           <a:p>
             <a:fld id="{9796027F-7875-4030-9381-8BD8C4F21935}" type="datetimeFigureOut">
               <a:rPr lang="en-US" dirty="0"/>
-              <a:t>2/17/2018</a:t>
+              <a:t>2/19/2018</a:t>
             </a:fld>
             <a:endParaRPr lang="en-US" dirty="0"/>
           </a:p>
@@ -4283,7 +4283,7 @@
           <a:p>
             <a:fld id="{9796027F-7875-4030-9381-8BD8C4F21935}" type="datetimeFigureOut">
               <a:rPr lang="en-US" dirty="0"/>
-              <a:t>2/17/2018</a:t>
+              <a:t>2/19/2018</a:t>
             </a:fld>
             <a:endParaRPr lang="en-US" dirty="0"/>
           </a:p>
@@ -4396,7 +4396,7 @@
           <a:p>
             <a:fld id="{4509A250-FF31-4206-8172-F9D3106AACB1}" type="datetimeFigureOut">
               <a:rPr lang="en-US" dirty="0"/>
-              <a:t>2/17/2018</a:t>
+              <a:t>2/19/2018</a:t>
             </a:fld>
             <a:endParaRPr lang="en-US" dirty="0"/>
           </a:p>
@@ -4486,7 +4486,7 @@
           <a:p>
             <a:fld id="{4509A250-FF31-4206-8172-F9D3106AACB1}" type="datetimeFigureOut">
               <a:rPr lang="en-US" dirty="0"/>
-              <a:t>2/17/2018</a:t>
+              <a:t>2/19/2018</a:t>
             </a:fld>
             <a:endParaRPr lang="en-US" dirty="0"/>
           </a:p>
@@ -4760,7 +4760,7 @@
           <a:p>
             <a:fld id="{4509A250-FF31-4206-8172-F9D3106AACB1}" type="datetimeFigureOut">
               <a:rPr lang="en-US" dirty="0"/>
-              <a:t>2/17/2018</a:t>
+              <a:t>2/19/2018</a:t>
             </a:fld>
             <a:endParaRPr lang="en-US" dirty="0"/>
           </a:p>
@@ -5030,7 +5030,7 @@
           <a:p>
             <a:fld id="{4509A250-FF31-4206-8172-F9D3106AACB1}" type="datetimeFigureOut">
               <a:rPr lang="en-US" dirty="0"/>
-              <a:t>2/17/2018</a:t>
+              <a:t>2/19/2018</a:t>
             </a:fld>
             <a:endParaRPr lang="en-US" dirty="0"/>
           </a:p>
@@ -5448,7 +5448,7 @@
           <a:p>
             <a:fld id="{4AAD347D-5ACD-4C99-B74B-A9C85AD731AF}" type="datetimeFigureOut">
               <a:rPr lang="en-US" dirty="0"/>
-              <a:t>2/17/2018</a:t>
+              <a:t>2/19/2018</a:t>
             </a:fld>
             <a:endParaRPr lang="en-US" dirty="0"/>
           </a:p>
@@ -6384,6 +6384,13 @@
             <a:r>
               <a:rPr lang="en-US" dirty="0"/>
               <a:t>Cells in the blood stream</a:t>
+            </a:r>
+          </a:p>
+          <a:p>
+            <a:pPr lvl="1"/>
+            <a:r>
+              <a:rPr lang="en-US" dirty="0"/>
+              <a:t>Ants in a colony</a:t>
             </a:r>
           </a:p>
           <a:p>

</xml_diff>